<commit_message>
Create single sticker is working
</commit_message>
<xml_diff>
--- a/src/graphics-design/sticker/sticker-header-digits/sticker-header-digits.pptx
+++ b/src/graphics-design/sticker/sticker-header-digits/sticker-header-digits.pptx
@@ -2,21 +2,21 @@
 <file path=ppt/presentation.xml><?xml version="1.0" encoding="utf-8"?>
 <p:presentation xmlns:a="http://schemas.openxmlformats.org/drawingml/2006/main" xmlns:r="http://schemas.openxmlformats.org/officeDocument/2006/relationships" xmlns:p="http://schemas.openxmlformats.org/presentationml/2006/main" saveSubsetFonts="1">
   <p:sldMasterIdLst>
-    <p:sldMasterId id="2147483744" r:id="rId1"/>
+    <p:sldMasterId id="2147483756" r:id="rId1"/>
   </p:sldMasterIdLst>
   <p:sldIdLst>
-    <p:sldId id="256" r:id="rId2"/>
-    <p:sldId id="257" r:id="rId3"/>
-    <p:sldId id="258" r:id="rId4"/>
-    <p:sldId id="259" r:id="rId5"/>
-    <p:sldId id="260" r:id="rId6"/>
-    <p:sldId id="261" r:id="rId7"/>
-    <p:sldId id="262" r:id="rId8"/>
-    <p:sldId id="263" r:id="rId9"/>
-    <p:sldId id="264" r:id="rId10"/>
-    <p:sldId id="265" r:id="rId11"/>
+    <p:sldId id="265" r:id="rId2"/>
+    <p:sldId id="266" r:id="rId3"/>
+    <p:sldId id="267" r:id="rId4"/>
+    <p:sldId id="268" r:id="rId5"/>
+    <p:sldId id="269" r:id="rId6"/>
+    <p:sldId id="270" r:id="rId7"/>
+    <p:sldId id="271" r:id="rId8"/>
+    <p:sldId id="272" r:id="rId9"/>
+    <p:sldId id="273" r:id="rId10"/>
+    <p:sldId id="274" r:id="rId11"/>
   </p:sldIdLst>
-  <p:sldSz cx="1562100" cy="2171700"/>
+  <p:sldSz cx="914400" cy="2171700"/>
   <p:notesSz cx="6858000" cy="9144000"/>
   <p:defaultTextStyle>
     <a:defPPr>
@@ -150,15 +150,15 @@
         </p:nvSpPr>
         <p:spPr>
           <a:xfrm>
-            <a:off x="117158" y="355415"/>
-            <a:ext cx="1327785" cy="756073"/>
+            <a:off x="68580" y="355415"/>
+            <a:ext cx="777240" cy="756073"/>
           </a:xfrm>
         </p:spPr>
         <p:txBody>
           <a:bodyPr anchor="b"/>
           <a:lstStyle>
             <a:lvl1pPr algn="ctr">
-              <a:defRPr sz="1025"/>
+              <a:defRPr sz="600"/>
             </a:lvl1pPr>
           </a:lstStyle>
           <a:p>
@@ -182,8 +182,8 @@
         </p:nvSpPr>
         <p:spPr>
           <a:xfrm>
-            <a:off x="195263" y="1140645"/>
-            <a:ext cx="1171575" cy="524325"/>
+            <a:off x="114300" y="1140645"/>
+            <a:ext cx="685800" cy="524325"/>
           </a:xfrm>
         </p:spPr>
         <p:txBody>
@@ -191,39 +191,39 @@
           <a:lstStyle>
             <a:lvl1pPr marL="0" indent="0" algn="ctr">
               <a:buNone/>
-              <a:defRPr sz="410"/>
+              <a:defRPr sz="240"/>
             </a:lvl1pPr>
-            <a:lvl2pPr marL="78090" indent="0" algn="ctr">
-              <a:buNone/>
-              <a:defRPr sz="342"/>
+            <a:lvl2pPr marL="45720" indent="0" algn="ctr">
+              <a:buNone/>
+              <a:defRPr sz="200"/>
             </a:lvl2pPr>
-            <a:lvl3pPr marL="156180" indent="0" algn="ctr">
-              <a:buNone/>
-              <a:defRPr sz="307"/>
+            <a:lvl3pPr marL="91440" indent="0" algn="ctr">
+              <a:buNone/>
+              <a:defRPr sz="180"/>
             </a:lvl3pPr>
-            <a:lvl4pPr marL="234269" indent="0" algn="ctr">
-              <a:buNone/>
-              <a:defRPr sz="273"/>
+            <a:lvl4pPr marL="137160" indent="0" algn="ctr">
+              <a:buNone/>
+              <a:defRPr sz="160"/>
             </a:lvl4pPr>
-            <a:lvl5pPr marL="312359" indent="0" algn="ctr">
-              <a:buNone/>
-              <a:defRPr sz="273"/>
+            <a:lvl5pPr marL="182880" indent="0" algn="ctr">
+              <a:buNone/>
+              <a:defRPr sz="160"/>
             </a:lvl5pPr>
-            <a:lvl6pPr marL="390449" indent="0" algn="ctr">
-              <a:buNone/>
-              <a:defRPr sz="273"/>
+            <a:lvl6pPr marL="228600" indent="0" algn="ctr">
+              <a:buNone/>
+              <a:defRPr sz="160"/>
             </a:lvl6pPr>
-            <a:lvl7pPr marL="468539" indent="0" algn="ctr">
-              <a:buNone/>
-              <a:defRPr sz="273"/>
+            <a:lvl7pPr marL="274320" indent="0" algn="ctr">
+              <a:buNone/>
+              <a:defRPr sz="160"/>
             </a:lvl7pPr>
-            <a:lvl8pPr marL="546628" indent="0" algn="ctr">
-              <a:buNone/>
-              <a:defRPr sz="273"/>
+            <a:lvl8pPr marL="320040" indent="0" algn="ctr">
+              <a:buNone/>
+              <a:defRPr sz="160"/>
             </a:lvl8pPr>
-            <a:lvl9pPr marL="624718" indent="0" algn="ctr">
-              <a:buNone/>
-              <a:defRPr sz="273"/>
+            <a:lvl9pPr marL="365760" indent="0" algn="ctr">
+              <a:buNone/>
+              <a:defRPr sz="160"/>
             </a:lvl9pPr>
           </a:lstStyle>
           <a:p>
@@ -303,7 +303,7 @@
     </p:spTree>
     <p:extLst>
       <p:ext uri="{BB962C8B-B14F-4D97-AF65-F5344CB8AC3E}">
-        <p14:creationId xmlns:p14="http://schemas.microsoft.com/office/powerpoint/2010/main" val="699162377"/>
+        <p14:creationId xmlns:p14="http://schemas.microsoft.com/office/powerpoint/2010/main" val="2488457518"/>
       </p:ext>
     </p:extLst>
   </p:cSld>
@@ -473,7 +473,7 @@
     </p:spTree>
     <p:extLst>
       <p:ext uri="{BB962C8B-B14F-4D97-AF65-F5344CB8AC3E}">
-        <p14:creationId xmlns:p14="http://schemas.microsoft.com/office/powerpoint/2010/main" val="2672667575"/>
+        <p14:creationId xmlns:p14="http://schemas.microsoft.com/office/powerpoint/2010/main" val="2599112643"/>
       </p:ext>
     </p:extLst>
   </p:cSld>
@@ -512,8 +512,8 @@
         </p:nvSpPr>
         <p:spPr>
           <a:xfrm>
-            <a:off x="1117878" y="115623"/>
-            <a:ext cx="336828" cy="1840415"/>
+            <a:off x="654367" y="115623"/>
+            <a:ext cx="197168" cy="1840415"/>
           </a:xfrm>
         </p:spPr>
         <p:txBody>
@@ -540,8 +540,8 @@
         </p:nvSpPr>
         <p:spPr>
           <a:xfrm>
-            <a:off x="107395" y="115623"/>
-            <a:ext cx="990957" cy="1840415"/>
+            <a:off x="62865" y="115623"/>
+            <a:ext cx="580073" cy="1840415"/>
           </a:xfrm>
         </p:spPr>
         <p:txBody>
@@ -653,7 +653,7 @@
     </p:spTree>
     <p:extLst>
       <p:ext uri="{BB962C8B-B14F-4D97-AF65-F5344CB8AC3E}">
-        <p14:creationId xmlns:p14="http://schemas.microsoft.com/office/powerpoint/2010/main" val="3401555336"/>
+        <p14:creationId xmlns:p14="http://schemas.microsoft.com/office/powerpoint/2010/main" val="1808608067"/>
       </p:ext>
     </p:extLst>
   </p:cSld>
@@ -823,7 +823,7 @@
     </p:spTree>
     <p:extLst>
       <p:ext uri="{BB962C8B-B14F-4D97-AF65-F5344CB8AC3E}">
-        <p14:creationId xmlns:p14="http://schemas.microsoft.com/office/powerpoint/2010/main" val="1257161622"/>
+        <p14:creationId xmlns:p14="http://schemas.microsoft.com/office/powerpoint/2010/main" val="709722491"/>
       </p:ext>
     </p:extLst>
   </p:cSld>
@@ -862,15 +862,15 @@
         </p:nvSpPr>
         <p:spPr>
           <a:xfrm>
-            <a:off x="106581" y="541417"/>
-            <a:ext cx="1347311" cy="903367"/>
+            <a:off x="62389" y="541417"/>
+            <a:ext cx="788670" cy="903367"/>
           </a:xfrm>
         </p:spPr>
         <p:txBody>
           <a:bodyPr anchor="b"/>
           <a:lstStyle>
             <a:lvl1pPr>
-              <a:defRPr sz="1025"/>
+              <a:defRPr sz="600"/>
             </a:lvl1pPr>
           </a:lstStyle>
           <a:p>
@@ -894,8 +894,8 @@
         </p:nvSpPr>
         <p:spPr>
           <a:xfrm>
-            <a:off x="106581" y="1453331"/>
-            <a:ext cx="1347311" cy="475059"/>
+            <a:off x="62389" y="1453331"/>
+            <a:ext cx="788670" cy="475059"/>
           </a:xfrm>
         </p:spPr>
         <p:txBody>
@@ -903,15 +903,15 @@
           <a:lstStyle>
             <a:lvl1pPr marL="0" indent="0">
               <a:buNone/>
-              <a:defRPr sz="410">
+              <a:defRPr sz="240">
                 <a:solidFill>
                   <a:schemeClr val="tx1"/>
                 </a:solidFill>
               </a:defRPr>
             </a:lvl1pPr>
-            <a:lvl2pPr marL="78090" indent="0">
-              <a:buNone/>
-              <a:defRPr sz="342">
+            <a:lvl2pPr marL="45720" indent="0">
+              <a:buNone/>
+              <a:defRPr sz="200">
                 <a:solidFill>
                   <a:schemeClr val="tx1">
                     <a:tint val="75000"/>
@@ -919,9 +919,9 @@
                 </a:solidFill>
               </a:defRPr>
             </a:lvl2pPr>
-            <a:lvl3pPr marL="156180" indent="0">
-              <a:buNone/>
-              <a:defRPr sz="307">
+            <a:lvl3pPr marL="91440" indent="0">
+              <a:buNone/>
+              <a:defRPr sz="180">
                 <a:solidFill>
                   <a:schemeClr val="tx1">
                     <a:tint val="75000"/>
@@ -929,9 +929,9 @@
                 </a:solidFill>
               </a:defRPr>
             </a:lvl3pPr>
-            <a:lvl4pPr marL="234269" indent="0">
-              <a:buNone/>
-              <a:defRPr sz="273">
+            <a:lvl4pPr marL="137160" indent="0">
+              <a:buNone/>
+              <a:defRPr sz="160">
                 <a:solidFill>
                   <a:schemeClr val="tx1">
                     <a:tint val="75000"/>
@@ -939,9 +939,9 @@
                 </a:solidFill>
               </a:defRPr>
             </a:lvl4pPr>
-            <a:lvl5pPr marL="312359" indent="0">
-              <a:buNone/>
-              <a:defRPr sz="273">
+            <a:lvl5pPr marL="182880" indent="0">
+              <a:buNone/>
+              <a:defRPr sz="160">
                 <a:solidFill>
                   <a:schemeClr val="tx1">
                     <a:tint val="75000"/>
@@ -949,9 +949,9 @@
                 </a:solidFill>
               </a:defRPr>
             </a:lvl5pPr>
-            <a:lvl6pPr marL="390449" indent="0">
-              <a:buNone/>
-              <a:defRPr sz="273">
+            <a:lvl6pPr marL="228600" indent="0">
+              <a:buNone/>
+              <a:defRPr sz="160">
                 <a:solidFill>
                   <a:schemeClr val="tx1">
                     <a:tint val="75000"/>
@@ -959,9 +959,9 @@
                 </a:solidFill>
               </a:defRPr>
             </a:lvl6pPr>
-            <a:lvl7pPr marL="468539" indent="0">
-              <a:buNone/>
-              <a:defRPr sz="273">
+            <a:lvl7pPr marL="274320" indent="0">
+              <a:buNone/>
+              <a:defRPr sz="160">
                 <a:solidFill>
                   <a:schemeClr val="tx1">
                     <a:tint val="75000"/>
@@ -969,9 +969,9 @@
                 </a:solidFill>
               </a:defRPr>
             </a:lvl7pPr>
-            <a:lvl8pPr marL="546628" indent="0">
-              <a:buNone/>
-              <a:defRPr sz="273">
+            <a:lvl8pPr marL="320040" indent="0">
+              <a:buNone/>
+              <a:defRPr sz="160">
                 <a:solidFill>
                   <a:schemeClr val="tx1">
                     <a:tint val="75000"/>
@@ -979,9 +979,9 @@
                 </a:solidFill>
               </a:defRPr>
             </a:lvl8pPr>
-            <a:lvl9pPr marL="624718" indent="0">
-              <a:buNone/>
-              <a:defRPr sz="273">
+            <a:lvl9pPr marL="365760" indent="0">
+              <a:buNone/>
+              <a:defRPr sz="160">
                 <a:solidFill>
                   <a:schemeClr val="tx1">
                     <a:tint val="75000"/>
@@ -1067,7 +1067,7 @@
     </p:spTree>
     <p:extLst>
       <p:ext uri="{BB962C8B-B14F-4D97-AF65-F5344CB8AC3E}">
-        <p14:creationId xmlns:p14="http://schemas.microsoft.com/office/powerpoint/2010/main" val="911022786"/>
+        <p14:creationId xmlns:p14="http://schemas.microsoft.com/office/powerpoint/2010/main" val="778215309"/>
       </p:ext>
     </p:extLst>
   </p:cSld>
@@ -1129,8 +1129,8 @@
         </p:nvSpPr>
         <p:spPr>
           <a:xfrm>
-            <a:off x="107394" y="578114"/>
-            <a:ext cx="663893" cy="1377924"/>
+            <a:off x="62865" y="578114"/>
+            <a:ext cx="388620" cy="1377924"/>
           </a:xfrm>
         </p:spPr>
         <p:txBody>
@@ -1186,8 +1186,8 @@
         </p:nvSpPr>
         <p:spPr>
           <a:xfrm>
-            <a:off x="790813" y="578114"/>
-            <a:ext cx="663893" cy="1377924"/>
+            <a:off x="462915" y="578114"/>
+            <a:ext cx="388620" cy="1377924"/>
           </a:xfrm>
         </p:spPr>
         <p:txBody>
@@ -1299,7 +1299,7 @@
     </p:spTree>
     <p:extLst>
       <p:ext uri="{BB962C8B-B14F-4D97-AF65-F5344CB8AC3E}">
-        <p14:creationId xmlns:p14="http://schemas.microsoft.com/office/powerpoint/2010/main" val="2493918097"/>
+        <p14:creationId xmlns:p14="http://schemas.microsoft.com/office/powerpoint/2010/main" val="4005726293"/>
       </p:ext>
     </p:extLst>
   </p:cSld>
@@ -1338,8 +1338,8 @@
         </p:nvSpPr>
         <p:spPr>
           <a:xfrm>
-            <a:off x="107598" y="115623"/>
-            <a:ext cx="1347311" cy="419762"/>
+            <a:off x="62984" y="115623"/>
+            <a:ext cx="788670" cy="419762"/>
           </a:xfrm>
         </p:spPr>
         <p:txBody>
@@ -1366,8 +1366,8 @@
         </p:nvSpPr>
         <p:spPr>
           <a:xfrm>
-            <a:off x="107598" y="532369"/>
-            <a:ext cx="660841" cy="260905"/>
+            <a:off x="62984" y="532369"/>
+            <a:ext cx="386834" cy="260905"/>
           </a:xfrm>
         </p:spPr>
         <p:txBody>
@@ -1375,39 +1375,39 @@
           <a:lstStyle>
             <a:lvl1pPr marL="0" indent="0">
               <a:buNone/>
-              <a:defRPr sz="410" b="1"/>
+              <a:defRPr sz="240" b="1"/>
             </a:lvl1pPr>
-            <a:lvl2pPr marL="78090" indent="0">
-              <a:buNone/>
-              <a:defRPr sz="342" b="1"/>
+            <a:lvl2pPr marL="45720" indent="0">
+              <a:buNone/>
+              <a:defRPr sz="200" b="1"/>
             </a:lvl2pPr>
-            <a:lvl3pPr marL="156180" indent="0">
-              <a:buNone/>
-              <a:defRPr sz="307" b="1"/>
+            <a:lvl3pPr marL="91440" indent="0">
+              <a:buNone/>
+              <a:defRPr sz="180" b="1"/>
             </a:lvl3pPr>
-            <a:lvl4pPr marL="234269" indent="0">
-              <a:buNone/>
-              <a:defRPr sz="273" b="1"/>
+            <a:lvl4pPr marL="137160" indent="0">
+              <a:buNone/>
+              <a:defRPr sz="160" b="1"/>
             </a:lvl4pPr>
-            <a:lvl5pPr marL="312359" indent="0">
-              <a:buNone/>
-              <a:defRPr sz="273" b="1"/>
+            <a:lvl5pPr marL="182880" indent="0">
+              <a:buNone/>
+              <a:defRPr sz="160" b="1"/>
             </a:lvl5pPr>
-            <a:lvl6pPr marL="390449" indent="0">
-              <a:buNone/>
-              <a:defRPr sz="273" b="1"/>
+            <a:lvl6pPr marL="228600" indent="0">
+              <a:buNone/>
+              <a:defRPr sz="160" b="1"/>
             </a:lvl6pPr>
-            <a:lvl7pPr marL="468539" indent="0">
-              <a:buNone/>
-              <a:defRPr sz="273" b="1"/>
+            <a:lvl7pPr marL="274320" indent="0">
+              <a:buNone/>
+              <a:defRPr sz="160" b="1"/>
             </a:lvl7pPr>
-            <a:lvl8pPr marL="546628" indent="0">
-              <a:buNone/>
-              <a:defRPr sz="273" b="1"/>
+            <a:lvl8pPr marL="320040" indent="0">
+              <a:buNone/>
+              <a:defRPr sz="160" b="1"/>
             </a:lvl8pPr>
-            <a:lvl9pPr marL="624718" indent="0">
-              <a:buNone/>
-              <a:defRPr sz="273" b="1"/>
+            <a:lvl9pPr marL="365760" indent="0">
+              <a:buNone/>
+              <a:defRPr sz="160" b="1"/>
             </a:lvl9pPr>
           </a:lstStyle>
           <a:p>
@@ -1431,8 +1431,8 @@
         </p:nvSpPr>
         <p:spPr>
           <a:xfrm>
-            <a:off x="107598" y="793274"/>
-            <a:ext cx="660841" cy="1166786"/>
+            <a:off x="62984" y="793274"/>
+            <a:ext cx="386834" cy="1166786"/>
           </a:xfrm>
         </p:spPr>
         <p:txBody>
@@ -1488,8 +1488,8 @@
         </p:nvSpPr>
         <p:spPr>
           <a:xfrm>
-            <a:off x="790813" y="532369"/>
-            <a:ext cx="664096" cy="260905"/>
+            <a:off x="462915" y="532369"/>
+            <a:ext cx="388739" cy="260905"/>
           </a:xfrm>
         </p:spPr>
         <p:txBody>
@@ -1497,39 +1497,39 @@
           <a:lstStyle>
             <a:lvl1pPr marL="0" indent="0">
               <a:buNone/>
-              <a:defRPr sz="410" b="1"/>
+              <a:defRPr sz="240" b="1"/>
             </a:lvl1pPr>
-            <a:lvl2pPr marL="78090" indent="0">
-              <a:buNone/>
-              <a:defRPr sz="342" b="1"/>
+            <a:lvl2pPr marL="45720" indent="0">
+              <a:buNone/>
+              <a:defRPr sz="200" b="1"/>
             </a:lvl2pPr>
-            <a:lvl3pPr marL="156180" indent="0">
-              <a:buNone/>
-              <a:defRPr sz="307" b="1"/>
+            <a:lvl3pPr marL="91440" indent="0">
+              <a:buNone/>
+              <a:defRPr sz="180" b="1"/>
             </a:lvl3pPr>
-            <a:lvl4pPr marL="234269" indent="0">
-              <a:buNone/>
-              <a:defRPr sz="273" b="1"/>
+            <a:lvl4pPr marL="137160" indent="0">
+              <a:buNone/>
+              <a:defRPr sz="160" b="1"/>
             </a:lvl4pPr>
-            <a:lvl5pPr marL="312359" indent="0">
-              <a:buNone/>
-              <a:defRPr sz="273" b="1"/>
+            <a:lvl5pPr marL="182880" indent="0">
+              <a:buNone/>
+              <a:defRPr sz="160" b="1"/>
             </a:lvl5pPr>
-            <a:lvl6pPr marL="390449" indent="0">
-              <a:buNone/>
-              <a:defRPr sz="273" b="1"/>
+            <a:lvl6pPr marL="228600" indent="0">
+              <a:buNone/>
+              <a:defRPr sz="160" b="1"/>
             </a:lvl6pPr>
-            <a:lvl7pPr marL="468539" indent="0">
-              <a:buNone/>
-              <a:defRPr sz="273" b="1"/>
+            <a:lvl7pPr marL="274320" indent="0">
+              <a:buNone/>
+              <a:defRPr sz="160" b="1"/>
             </a:lvl7pPr>
-            <a:lvl8pPr marL="546628" indent="0">
-              <a:buNone/>
-              <a:defRPr sz="273" b="1"/>
+            <a:lvl8pPr marL="320040" indent="0">
+              <a:buNone/>
+              <a:defRPr sz="160" b="1"/>
             </a:lvl8pPr>
-            <a:lvl9pPr marL="624718" indent="0">
-              <a:buNone/>
-              <a:defRPr sz="273" b="1"/>
+            <a:lvl9pPr marL="365760" indent="0">
+              <a:buNone/>
+              <a:defRPr sz="160" b="1"/>
             </a:lvl9pPr>
           </a:lstStyle>
           <a:p>
@@ -1553,8 +1553,8 @@
         </p:nvSpPr>
         <p:spPr>
           <a:xfrm>
-            <a:off x="790813" y="793274"/>
-            <a:ext cx="664096" cy="1166786"/>
+            <a:off x="462915" y="793274"/>
+            <a:ext cx="388739" cy="1166786"/>
           </a:xfrm>
         </p:spPr>
         <p:txBody>
@@ -1666,7 +1666,7 @@
     </p:spTree>
     <p:extLst>
       <p:ext uri="{BB962C8B-B14F-4D97-AF65-F5344CB8AC3E}">
-        <p14:creationId xmlns:p14="http://schemas.microsoft.com/office/powerpoint/2010/main" val="2506023947"/>
+        <p14:creationId xmlns:p14="http://schemas.microsoft.com/office/powerpoint/2010/main" val="3814493253"/>
       </p:ext>
     </p:extLst>
   </p:cSld>
@@ -1784,7 +1784,7 @@
     </p:spTree>
     <p:extLst>
       <p:ext uri="{BB962C8B-B14F-4D97-AF65-F5344CB8AC3E}">
-        <p14:creationId xmlns:p14="http://schemas.microsoft.com/office/powerpoint/2010/main" val="1177134246"/>
+        <p14:creationId xmlns:p14="http://schemas.microsoft.com/office/powerpoint/2010/main" val="3489463197"/>
       </p:ext>
     </p:extLst>
   </p:cSld>
@@ -1879,7 +1879,7 @@
     </p:spTree>
     <p:extLst>
       <p:ext uri="{BB962C8B-B14F-4D97-AF65-F5344CB8AC3E}">
-        <p14:creationId xmlns:p14="http://schemas.microsoft.com/office/powerpoint/2010/main" val="1708828413"/>
+        <p14:creationId xmlns:p14="http://schemas.microsoft.com/office/powerpoint/2010/main" val="3719240108"/>
       </p:ext>
     </p:extLst>
   </p:cSld>
@@ -1918,15 +1918,15 @@
         </p:nvSpPr>
         <p:spPr>
           <a:xfrm>
-            <a:off x="107598" y="144780"/>
-            <a:ext cx="503818" cy="506730"/>
+            <a:off x="62984" y="144780"/>
+            <a:ext cx="294918" cy="506730"/>
           </a:xfrm>
         </p:spPr>
         <p:txBody>
           <a:bodyPr anchor="b"/>
           <a:lstStyle>
             <a:lvl1pPr>
-              <a:defRPr sz="547"/>
+              <a:defRPr sz="320"/>
             </a:lvl1pPr>
           </a:lstStyle>
           <a:p>
@@ -1950,39 +1950,39 @@
         </p:nvSpPr>
         <p:spPr>
           <a:xfrm>
-            <a:off x="664096" y="312685"/>
-            <a:ext cx="790813" cy="1543315"/>
+            <a:off x="388739" y="312685"/>
+            <a:ext cx="462915" cy="1543315"/>
           </a:xfrm>
         </p:spPr>
         <p:txBody>
           <a:bodyPr/>
           <a:lstStyle>
             <a:lvl1pPr>
-              <a:defRPr sz="547"/>
+              <a:defRPr sz="320"/>
             </a:lvl1pPr>
             <a:lvl2pPr>
-              <a:defRPr sz="478"/>
+              <a:defRPr sz="280"/>
             </a:lvl2pPr>
             <a:lvl3pPr>
-              <a:defRPr sz="410"/>
+              <a:defRPr sz="240"/>
             </a:lvl3pPr>
             <a:lvl4pPr>
-              <a:defRPr sz="342"/>
+              <a:defRPr sz="200"/>
             </a:lvl4pPr>
             <a:lvl5pPr>
-              <a:defRPr sz="342"/>
+              <a:defRPr sz="200"/>
             </a:lvl5pPr>
             <a:lvl6pPr>
-              <a:defRPr sz="342"/>
+              <a:defRPr sz="200"/>
             </a:lvl6pPr>
             <a:lvl7pPr>
-              <a:defRPr sz="342"/>
+              <a:defRPr sz="200"/>
             </a:lvl7pPr>
             <a:lvl8pPr>
-              <a:defRPr sz="342"/>
+              <a:defRPr sz="200"/>
             </a:lvl8pPr>
             <a:lvl9pPr>
-              <a:defRPr sz="342"/>
+              <a:defRPr sz="200"/>
             </a:lvl9pPr>
           </a:lstStyle>
           <a:p>
@@ -2035,8 +2035,8 @@
         </p:nvSpPr>
         <p:spPr>
           <a:xfrm>
-            <a:off x="107598" y="651510"/>
-            <a:ext cx="503818" cy="1207003"/>
+            <a:off x="62984" y="651510"/>
+            <a:ext cx="294918" cy="1207003"/>
           </a:xfrm>
         </p:spPr>
         <p:txBody>
@@ -2044,39 +2044,39 @@
           <a:lstStyle>
             <a:lvl1pPr marL="0" indent="0">
               <a:buNone/>
-              <a:defRPr sz="273"/>
+              <a:defRPr sz="160"/>
             </a:lvl1pPr>
-            <a:lvl2pPr marL="78090" indent="0">
-              <a:buNone/>
-              <a:defRPr sz="239"/>
+            <a:lvl2pPr marL="45720" indent="0">
+              <a:buNone/>
+              <a:defRPr sz="140"/>
             </a:lvl2pPr>
-            <a:lvl3pPr marL="156180" indent="0">
-              <a:buNone/>
-              <a:defRPr sz="205"/>
+            <a:lvl3pPr marL="91440" indent="0">
+              <a:buNone/>
+              <a:defRPr sz="120"/>
             </a:lvl3pPr>
-            <a:lvl4pPr marL="234269" indent="0">
-              <a:buNone/>
-              <a:defRPr sz="171"/>
+            <a:lvl4pPr marL="137160" indent="0">
+              <a:buNone/>
+              <a:defRPr sz="100"/>
             </a:lvl4pPr>
-            <a:lvl5pPr marL="312359" indent="0">
-              <a:buNone/>
-              <a:defRPr sz="171"/>
+            <a:lvl5pPr marL="182880" indent="0">
+              <a:buNone/>
+              <a:defRPr sz="100"/>
             </a:lvl5pPr>
-            <a:lvl6pPr marL="390449" indent="0">
-              <a:buNone/>
-              <a:defRPr sz="171"/>
+            <a:lvl6pPr marL="228600" indent="0">
+              <a:buNone/>
+              <a:defRPr sz="100"/>
             </a:lvl6pPr>
-            <a:lvl7pPr marL="468539" indent="0">
-              <a:buNone/>
-              <a:defRPr sz="171"/>
+            <a:lvl7pPr marL="274320" indent="0">
+              <a:buNone/>
+              <a:defRPr sz="100"/>
             </a:lvl7pPr>
-            <a:lvl8pPr marL="546628" indent="0">
-              <a:buNone/>
-              <a:defRPr sz="171"/>
+            <a:lvl8pPr marL="320040" indent="0">
+              <a:buNone/>
+              <a:defRPr sz="100"/>
             </a:lvl8pPr>
-            <a:lvl9pPr marL="624718" indent="0">
-              <a:buNone/>
-              <a:defRPr sz="171"/>
+            <a:lvl9pPr marL="365760" indent="0">
+              <a:buNone/>
+              <a:defRPr sz="100"/>
             </a:lvl9pPr>
           </a:lstStyle>
           <a:p>
@@ -2156,7 +2156,7 @@
     </p:spTree>
     <p:extLst>
       <p:ext uri="{BB962C8B-B14F-4D97-AF65-F5344CB8AC3E}">
-        <p14:creationId xmlns:p14="http://schemas.microsoft.com/office/powerpoint/2010/main" val="3336519796"/>
+        <p14:creationId xmlns:p14="http://schemas.microsoft.com/office/powerpoint/2010/main" val="2811333772"/>
       </p:ext>
     </p:extLst>
   </p:cSld>
@@ -2195,15 +2195,15 @@
         </p:nvSpPr>
         <p:spPr>
           <a:xfrm>
-            <a:off x="107598" y="144780"/>
-            <a:ext cx="503818" cy="506730"/>
+            <a:off x="62984" y="144780"/>
+            <a:ext cx="294918" cy="506730"/>
           </a:xfrm>
         </p:spPr>
         <p:txBody>
           <a:bodyPr anchor="b"/>
           <a:lstStyle>
             <a:lvl1pPr>
-              <a:defRPr sz="547"/>
+              <a:defRPr sz="320"/>
             </a:lvl1pPr>
           </a:lstStyle>
           <a:p>
@@ -2227,8 +2227,8 @@
         </p:nvSpPr>
         <p:spPr>
           <a:xfrm>
-            <a:off x="664096" y="312685"/>
-            <a:ext cx="790813" cy="1543315"/>
+            <a:off x="388739" y="312685"/>
+            <a:ext cx="462915" cy="1543315"/>
           </a:xfrm>
         </p:spPr>
         <p:txBody>
@@ -2236,39 +2236,39 @@
           <a:lstStyle>
             <a:lvl1pPr marL="0" indent="0">
               <a:buNone/>
-              <a:defRPr sz="547"/>
+              <a:defRPr sz="320"/>
             </a:lvl1pPr>
-            <a:lvl2pPr marL="78090" indent="0">
-              <a:buNone/>
-              <a:defRPr sz="478"/>
+            <a:lvl2pPr marL="45720" indent="0">
+              <a:buNone/>
+              <a:defRPr sz="280"/>
             </a:lvl2pPr>
-            <a:lvl3pPr marL="156180" indent="0">
-              <a:buNone/>
-              <a:defRPr sz="410"/>
+            <a:lvl3pPr marL="91440" indent="0">
+              <a:buNone/>
+              <a:defRPr sz="240"/>
             </a:lvl3pPr>
-            <a:lvl4pPr marL="234269" indent="0">
-              <a:buNone/>
-              <a:defRPr sz="342"/>
+            <a:lvl4pPr marL="137160" indent="0">
+              <a:buNone/>
+              <a:defRPr sz="200"/>
             </a:lvl4pPr>
-            <a:lvl5pPr marL="312359" indent="0">
-              <a:buNone/>
-              <a:defRPr sz="342"/>
+            <a:lvl5pPr marL="182880" indent="0">
+              <a:buNone/>
+              <a:defRPr sz="200"/>
             </a:lvl5pPr>
-            <a:lvl6pPr marL="390449" indent="0">
-              <a:buNone/>
-              <a:defRPr sz="342"/>
+            <a:lvl6pPr marL="228600" indent="0">
+              <a:buNone/>
+              <a:defRPr sz="200"/>
             </a:lvl6pPr>
-            <a:lvl7pPr marL="468539" indent="0">
-              <a:buNone/>
-              <a:defRPr sz="342"/>
+            <a:lvl7pPr marL="274320" indent="0">
+              <a:buNone/>
+              <a:defRPr sz="200"/>
             </a:lvl7pPr>
-            <a:lvl8pPr marL="546628" indent="0">
-              <a:buNone/>
-              <a:defRPr sz="342"/>
+            <a:lvl8pPr marL="320040" indent="0">
+              <a:buNone/>
+              <a:defRPr sz="200"/>
             </a:lvl8pPr>
-            <a:lvl9pPr marL="624718" indent="0">
-              <a:buNone/>
-              <a:defRPr sz="342"/>
+            <a:lvl9pPr marL="365760" indent="0">
+              <a:buNone/>
+              <a:defRPr sz="200"/>
             </a:lvl9pPr>
           </a:lstStyle>
           <a:p>
@@ -2292,8 +2292,8 @@
         </p:nvSpPr>
         <p:spPr>
           <a:xfrm>
-            <a:off x="107598" y="651510"/>
-            <a:ext cx="503818" cy="1207003"/>
+            <a:off x="62984" y="651510"/>
+            <a:ext cx="294918" cy="1207003"/>
           </a:xfrm>
         </p:spPr>
         <p:txBody>
@@ -2301,39 +2301,39 @@
           <a:lstStyle>
             <a:lvl1pPr marL="0" indent="0">
               <a:buNone/>
-              <a:defRPr sz="273"/>
+              <a:defRPr sz="160"/>
             </a:lvl1pPr>
-            <a:lvl2pPr marL="78090" indent="0">
-              <a:buNone/>
-              <a:defRPr sz="239"/>
+            <a:lvl2pPr marL="45720" indent="0">
+              <a:buNone/>
+              <a:defRPr sz="140"/>
             </a:lvl2pPr>
-            <a:lvl3pPr marL="156180" indent="0">
-              <a:buNone/>
-              <a:defRPr sz="205"/>
+            <a:lvl3pPr marL="91440" indent="0">
+              <a:buNone/>
+              <a:defRPr sz="120"/>
             </a:lvl3pPr>
-            <a:lvl4pPr marL="234269" indent="0">
-              <a:buNone/>
-              <a:defRPr sz="171"/>
+            <a:lvl4pPr marL="137160" indent="0">
+              <a:buNone/>
+              <a:defRPr sz="100"/>
             </a:lvl4pPr>
-            <a:lvl5pPr marL="312359" indent="0">
-              <a:buNone/>
-              <a:defRPr sz="171"/>
+            <a:lvl5pPr marL="182880" indent="0">
+              <a:buNone/>
+              <a:defRPr sz="100"/>
             </a:lvl5pPr>
-            <a:lvl6pPr marL="390449" indent="0">
-              <a:buNone/>
-              <a:defRPr sz="171"/>
+            <a:lvl6pPr marL="228600" indent="0">
+              <a:buNone/>
+              <a:defRPr sz="100"/>
             </a:lvl6pPr>
-            <a:lvl7pPr marL="468539" indent="0">
-              <a:buNone/>
-              <a:defRPr sz="171"/>
+            <a:lvl7pPr marL="274320" indent="0">
+              <a:buNone/>
+              <a:defRPr sz="100"/>
             </a:lvl7pPr>
-            <a:lvl8pPr marL="546628" indent="0">
-              <a:buNone/>
-              <a:defRPr sz="171"/>
+            <a:lvl8pPr marL="320040" indent="0">
+              <a:buNone/>
+              <a:defRPr sz="100"/>
             </a:lvl8pPr>
-            <a:lvl9pPr marL="624718" indent="0">
-              <a:buNone/>
-              <a:defRPr sz="171"/>
+            <a:lvl9pPr marL="365760" indent="0">
+              <a:buNone/>
+              <a:defRPr sz="100"/>
             </a:lvl9pPr>
           </a:lstStyle>
           <a:p>
@@ -2413,7 +2413,7 @@
     </p:spTree>
     <p:extLst>
       <p:ext uri="{BB962C8B-B14F-4D97-AF65-F5344CB8AC3E}">
-        <p14:creationId xmlns:p14="http://schemas.microsoft.com/office/powerpoint/2010/main" val="1903160165"/>
+        <p14:creationId xmlns:p14="http://schemas.microsoft.com/office/powerpoint/2010/main" val="3028473842"/>
       </p:ext>
     </p:extLst>
   </p:cSld>
@@ -2457,8 +2457,8 @@
         </p:nvSpPr>
         <p:spPr>
           <a:xfrm>
-            <a:off x="107395" y="115623"/>
-            <a:ext cx="1347311" cy="419762"/>
+            <a:off x="62865" y="115623"/>
+            <a:ext cx="788670" cy="419762"/>
           </a:xfrm>
           <a:prstGeom prst="rect">
             <a:avLst/>
@@ -2490,8 +2490,8 @@
         </p:nvSpPr>
         <p:spPr>
           <a:xfrm>
-            <a:off x="107395" y="578114"/>
-            <a:ext cx="1347311" cy="1377924"/>
+            <a:off x="62865" y="578114"/>
+            <a:ext cx="788670" cy="1377924"/>
           </a:xfrm>
           <a:prstGeom prst="rect">
             <a:avLst/>
@@ -2552,8 +2552,8 @@
         </p:nvSpPr>
         <p:spPr>
           <a:xfrm>
-            <a:off x="107394" y="2012845"/>
-            <a:ext cx="351473" cy="115623"/>
+            <a:off x="62865" y="2012845"/>
+            <a:ext cx="205740" cy="115623"/>
           </a:xfrm>
           <a:prstGeom prst="rect">
             <a:avLst/>
@@ -2563,7 +2563,7 @@
           <a:bodyPr vert="horz" lIns="91440" tIns="45720" rIns="91440" bIns="45720" rtlCol="0" anchor="ctr"/>
           <a:lstStyle>
             <a:lvl1pPr algn="l">
-              <a:defRPr sz="205">
+              <a:defRPr sz="120">
                 <a:solidFill>
                   <a:schemeClr val="tx1">
                     <a:tint val="75000"/>
@@ -2593,8 +2593,8 @@
         </p:nvSpPr>
         <p:spPr>
           <a:xfrm>
-            <a:off x="517446" y="2012845"/>
-            <a:ext cx="527209" cy="115623"/>
+            <a:off x="302895" y="2012845"/>
+            <a:ext cx="308610" cy="115623"/>
           </a:xfrm>
           <a:prstGeom prst="rect">
             <a:avLst/>
@@ -2604,7 +2604,7 @@
           <a:bodyPr vert="horz" lIns="91440" tIns="45720" rIns="91440" bIns="45720" rtlCol="0" anchor="ctr"/>
           <a:lstStyle>
             <a:lvl1pPr algn="ctr">
-              <a:defRPr sz="205">
+              <a:defRPr sz="120">
                 <a:solidFill>
                   <a:schemeClr val="tx1">
                     <a:tint val="75000"/>
@@ -2630,8 +2630,8 @@
         </p:nvSpPr>
         <p:spPr>
           <a:xfrm>
-            <a:off x="1103233" y="2012845"/>
-            <a:ext cx="351473" cy="115623"/>
+            <a:off x="645795" y="2012845"/>
+            <a:ext cx="205740" cy="115623"/>
           </a:xfrm>
           <a:prstGeom prst="rect">
             <a:avLst/>
@@ -2641,7 +2641,7 @@
           <a:bodyPr vert="horz" lIns="91440" tIns="45720" rIns="91440" bIns="45720" rtlCol="0" anchor="ctr"/>
           <a:lstStyle>
             <a:lvl1pPr algn="r">
-              <a:defRPr sz="205">
+              <a:defRPr sz="120">
                 <a:solidFill>
                   <a:schemeClr val="tx1">
                     <a:tint val="75000"/>
@@ -2662,27 +2662,27 @@
     </p:spTree>
     <p:extLst>
       <p:ext uri="{BB962C8B-B14F-4D97-AF65-F5344CB8AC3E}">
-        <p14:creationId xmlns:p14="http://schemas.microsoft.com/office/powerpoint/2010/main" val="3199089836"/>
+        <p14:creationId xmlns:p14="http://schemas.microsoft.com/office/powerpoint/2010/main" val="556578101"/>
       </p:ext>
     </p:extLst>
   </p:cSld>
   <p:clrMap bg1="lt1" tx1="dk1" bg2="lt2" tx2="dk2" accent1="accent1" accent2="accent2" accent3="accent3" accent4="accent4" accent5="accent5" accent6="accent6" hlink="hlink" folHlink="folHlink"/>
   <p:sldLayoutIdLst>
-    <p:sldLayoutId id="2147483745" r:id="rId1"/>
-    <p:sldLayoutId id="2147483746" r:id="rId2"/>
-    <p:sldLayoutId id="2147483747" r:id="rId3"/>
-    <p:sldLayoutId id="2147483748" r:id="rId4"/>
-    <p:sldLayoutId id="2147483749" r:id="rId5"/>
-    <p:sldLayoutId id="2147483750" r:id="rId6"/>
-    <p:sldLayoutId id="2147483751" r:id="rId7"/>
-    <p:sldLayoutId id="2147483752" r:id="rId8"/>
-    <p:sldLayoutId id="2147483753" r:id="rId9"/>
-    <p:sldLayoutId id="2147483754" r:id="rId10"/>
-    <p:sldLayoutId id="2147483755" r:id="rId11"/>
+    <p:sldLayoutId id="2147483757" r:id="rId1"/>
+    <p:sldLayoutId id="2147483758" r:id="rId2"/>
+    <p:sldLayoutId id="2147483759" r:id="rId3"/>
+    <p:sldLayoutId id="2147483760" r:id="rId4"/>
+    <p:sldLayoutId id="2147483761" r:id="rId5"/>
+    <p:sldLayoutId id="2147483762" r:id="rId6"/>
+    <p:sldLayoutId id="2147483763" r:id="rId7"/>
+    <p:sldLayoutId id="2147483764" r:id="rId8"/>
+    <p:sldLayoutId id="2147483765" r:id="rId9"/>
+    <p:sldLayoutId id="2147483766" r:id="rId10"/>
+    <p:sldLayoutId id="2147483767" r:id="rId11"/>
   </p:sldLayoutIdLst>
   <p:txStyles>
     <p:titleStyle>
-      <a:lvl1pPr algn="l" defTabSz="156180" rtl="0" eaLnBrk="1" latinLnBrk="0" hangingPunct="1">
+      <a:lvl1pPr algn="l" defTabSz="91440" rtl="0" eaLnBrk="1" latinLnBrk="0" hangingPunct="1">
         <a:lnSpc>
           <a:spcPct val="90000"/>
         </a:lnSpc>
@@ -2690,7 +2690,7 @@
           <a:spcPct val="0"/>
         </a:spcBef>
         <a:buNone/>
-        <a:defRPr sz="752" kern="1200">
+        <a:defRPr sz="440" kern="1200">
           <a:solidFill>
             <a:schemeClr val="tx1"/>
           </a:solidFill>
@@ -2701,16 +2701,16 @@
       </a:lvl1pPr>
     </p:titleStyle>
     <p:bodyStyle>
-      <a:lvl1pPr marL="39045" indent="-39045" algn="l" defTabSz="156180" rtl="0" eaLnBrk="1" latinLnBrk="0" hangingPunct="1">
+      <a:lvl1pPr marL="22860" indent="-22860" algn="l" defTabSz="91440" rtl="0" eaLnBrk="1" latinLnBrk="0" hangingPunct="1">
         <a:lnSpc>
           <a:spcPct val="90000"/>
         </a:lnSpc>
         <a:spcBef>
-          <a:spcPts val="171"/>
+          <a:spcPts val="100"/>
         </a:spcBef>
         <a:buFont typeface="Arial" panose="020B0604020202020204" pitchFamily="34" charset="0"/>
         <a:buChar char="•"/>
-        <a:defRPr sz="478" kern="1200">
+        <a:defRPr sz="280" kern="1200">
           <a:solidFill>
             <a:schemeClr val="tx1"/>
           </a:solidFill>
@@ -2719,16 +2719,16 @@
           <a:cs typeface="+mn-cs"/>
         </a:defRPr>
       </a:lvl1pPr>
-      <a:lvl2pPr marL="117135" indent="-39045" algn="l" defTabSz="156180" rtl="0" eaLnBrk="1" latinLnBrk="0" hangingPunct="1">
+      <a:lvl2pPr marL="68580" indent="-22860" algn="l" defTabSz="91440" rtl="0" eaLnBrk="1" latinLnBrk="0" hangingPunct="1">
         <a:lnSpc>
           <a:spcPct val="90000"/>
         </a:lnSpc>
         <a:spcBef>
-          <a:spcPts val="85"/>
+          <a:spcPts val="50"/>
         </a:spcBef>
         <a:buFont typeface="Arial" panose="020B0604020202020204" pitchFamily="34" charset="0"/>
         <a:buChar char="•"/>
-        <a:defRPr sz="410" kern="1200">
+        <a:defRPr sz="240" kern="1200">
           <a:solidFill>
             <a:schemeClr val="tx1"/>
           </a:solidFill>
@@ -2737,16 +2737,16 @@
           <a:cs typeface="+mn-cs"/>
         </a:defRPr>
       </a:lvl2pPr>
-      <a:lvl3pPr marL="195224" indent="-39045" algn="l" defTabSz="156180" rtl="0" eaLnBrk="1" latinLnBrk="0" hangingPunct="1">
+      <a:lvl3pPr marL="114300" indent="-22860" algn="l" defTabSz="91440" rtl="0" eaLnBrk="1" latinLnBrk="0" hangingPunct="1">
         <a:lnSpc>
           <a:spcPct val="90000"/>
         </a:lnSpc>
         <a:spcBef>
-          <a:spcPts val="85"/>
+          <a:spcPts val="50"/>
         </a:spcBef>
         <a:buFont typeface="Arial" panose="020B0604020202020204" pitchFamily="34" charset="0"/>
         <a:buChar char="•"/>
-        <a:defRPr sz="342" kern="1200">
+        <a:defRPr sz="200" kern="1200">
           <a:solidFill>
             <a:schemeClr val="tx1"/>
           </a:solidFill>
@@ -2755,16 +2755,16 @@
           <a:cs typeface="+mn-cs"/>
         </a:defRPr>
       </a:lvl3pPr>
-      <a:lvl4pPr marL="273314" indent="-39045" algn="l" defTabSz="156180" rtl="0" eaLnBrk="1" latinLnBrk="0" hangingPunct="1">
+      <a:lvl4pPr marL="160020" indent="-22860" algn="l" defTabSz="91440" rtl="0" eaLnBrk="1" latinLnBrk="0" hangingPunct="1">
         <a:lnSpc>
           <a:spcPct val="90000"/>
         </a:lnSpc>
         <a:spcBef>
-          <a:spcPts val="85"/>
+          <a:spcPts val="50"/>
         </a:spcBef>
         <a:buFont typeface="Arial" panose="020B0604020202020204" pitchFamily="34" charset="0"/>
         <a:buChar char="•"/>
-        <a:defRPr sz="307" kern="1200">
+        <a:defRPr sz="180" kern="1200">
           <a:solidFill>
             <a:schemeClr val="tx1"/>
           </a:solidFill>
@@ -2773,16 +2773,16 @@
           <a:cs typeface="+mn-cs"/>
         </a:defRPr>
       </a:lvl4pPr>
-      <a:lvl5pPr marL="351404" indent="-39045" algn="l" defTabSz="156180" rtl="0" eaLnBrk="1" latinLnBrk="0" hangingPunct="1">
+      <a:lvl5pPr marL="205740" indent="-22860" algn="l" defTabSz="91440" rtl="0" eaLnBrk="1" latinLnBrk="0" hangingPunct="1">
         <a:lnSpc>
           <a:spcPct val="90000"/>
         </a:lnSpc>
         <a:spcBef>
-          <a:spcPts val="85"/>
+          <a:spcPts val="50"/>
         </a:spcBef>
         <a:buFont typeface="Arial" panose="020B0604020202020204" pitchFamily="34" charset="0"/>
         <a:buChar char="•"/>
-        <a:defRPr sz="307" kern="1200">
+        <a:defRPr sz="180" kern="1200">
           <a:solidFill>
             <a:schemeClr val="tx1"/>
           </a:solidFill>
@@ -2791,16 +2791,16 @@
           <a:cs typeface="+mn-cs"/>
         </a:defRPr>
       </a:lvl5pPr>
-      <a:lvl6pPr marL="429494" indent="-39045" algn="l" defTabSz="156180" rtl="0" eaLnBrk="1" latinLnBrk="0" hangingPunct="1">
+      <a:lvl6pPr marL="251460" indent="-22860" algn="l" defTabSz="91440" rtl="0" eaLnBrk="1" latinLnBrk="0" hangingPunct="1">
         <a:lnSpc>
           <a:spcPct val="90000"/>
         </a:lnSpc>
         <a:spcBef>
-          <a:spcPts val="85"/>
+          <a:spcPts val="50"/>
         </a:spcBef>
         <a:buFont typeface="Arial" panose="020B0604020202020204" pitchFamily="34" charset="0"/>
         <a:buChar char="•"/>
-        <a:defRPr sz="307" kern="1200">
+        <a:defRPr sz="180" kern="1200">
           <a:solidFill>
             <a:schemeClr val="tx1"/>
           </a:solidFill>
@@ -2809,16 +2809,16 @@
           <a:cs typeface="+mn-cs"/>
         </a:defRPr>
       </a:lvl6pPr>
-      <a:lvl7pPr marL="507583" indent="-39045" algn="l" defTabSz="156180" rtl="0" eaLnBrk="1" latinLnBrk="0" hangingPunct="1">
+      <a:lvl7pPr marL="297180" indent="-22860" algn="l" defTabSz="91440" rtl="0" eaLnBrk="1" latinLnBrk="0" hangingPunct="1">
         <a:lnSpc>
           <a:spcPct val="90000"/>
         </a:lnSpc>
         <a:spcBef>
-          <a:spcPts val="85"/>
+          <a:spcPts val="50"/>
         </a:spcBef>
         <a:buFont typeface="Arial" panose="020B0604020202020204" pitchFamily="34" charset="0"/>
         <a:buChar char="•"/>
-        <a:defRPr sz="307" kern="1200">
+        <a:defRPr sz="180" kern="1200">
           <a:solidFill>
             <a:schemeClr val="tx1"/>
           </a:solidFill>
@@ -2827,16 +2827,16 @@
           <a:cs typeface="+mn-cs"/>
         </a:defRPr>
       </a:lvl7pPr>
-      <a:lvl8pPr marL="585673" indent="-39045" algn="l" defTabSz="156180" rtl="0" eaLnBrk="1" latinLnBrk="0" hangingPunct="1">
+      <a:lvl8pPr marL="342900" indent="-22860" algn="l" defTabSz="91440" rtl="0" eaLnBrk="1" latinLnBrk="0" hangingPunct="1">
         <a:lnSpc>
           <a:spcPct val="90000"/>
         </a:lnSpc>
         <a:spcBef>
-          <a:spcPts val="85"/>
+          <a:spcPts val="50"/>
         </a:spcBef>
         <a:buFont typeface="Arial" panose="020B0604020202020204" pitchFamily="34" charset="0"/>
         <a:buChar char="•"/>
-        <a:defRPr sz="307" kern="1200">
+        <a:defRPr sz="180" kern="1200">
           <a:solidFill>
             <a:schemeClr val="tx1"/>
           </a:solidFill>
@@ -2845,16 +2845,16 @@
           <a:cs typeface="+mn-cs"/>
         </a:defRPr>
       </a:lvl8pPr>
-      <a:lvl9pPr marL="663763" indent="-39045" algn="l" defTabSz="156180" rtl="0" eaLnBrk="1" latinLnBrk="0" hangingPunct="1">
+      <a:lvl9pPr marL="388620" indent="-22860" algn="l" defTabSz="91440" rtl="0" eaLnBrk="1" latinLnBrk="0" hangingPunct="1">
         <a:lnSpc>
           <a:spcPct val="90000"/>
         </a:lnSpc>
         <a:spcBef>
-          <a:spcPts val="85"/>
+          <a:spcPts val="50"/>
         </a:spcBef>
         <a:buFont typeface="Arial" panose="020B0604020202020204" pitchFamily="34" charset="0"/>
         <a:buChar char="•"/>
-        <a:defRPr sz="307" kern="1200">
+        <a:defRPr sz="180" kern="1200">
           <a:solidFill>
             <a:schemeClr val="tx1"/>
           </a:solidFill>
@@ -2868,8 +2868,8 @@
       <a:defPPr>
         <a:defRPr lang="en-US"/>
       </a:defPPr>
-      <a:lvl1pPr marL="0" algn="l" defTabSz="156180" rtl="0" eaLnBrk="1" latinLnBrk="0" hangingPunct="1">
-        <a:defRPr sz="307" kern="1200">
+      <a:lvl1pPr marL="0" algn="l" defTabSz="91440" rtl="0" eaLnBrk="1" latinLnBrk="0" hangingPunct="1">
+        <a:defRPr sz="180" kern="1200">
           <a:solidFill>
             <a:schemeClr val="tx1"/>
           </a:solidFill>
@@ -2878,8 +2878,8 @@
           <a:cs typeface="+mn-cs"/>
         </a:defRPr>
       </a:lvl1pPr>
-      <a:lvl2pPr marL="78090" algn="l" defTabSz="156180" rtl="0" eaLnBrk="1" latinLnBrk="0" hangingPunct="1">
-        <a:defRPr sz="307" kern="1200">
+      <a:lvl2pPr marL="45720" algn="l" defTabSz="91440" rtl="0" eaLnBrk="1" latinLnBrk="0" hangingPunct="1">
+        <a:defRPr sz="180" kern="1200">
           <a:solidFill>
             <a:schemeClr val="tx1"/>
           </a:solidFill>
@@ -2888,8 +2888,8 @@
           <a:cs typeface="+mn-cs"/>
         </a:defRPr>
       </a:lvl2pPr>
-      <a:lvl3pPr marL="156180" algn="l" defTabSz="156180" rtl="0" eaLnBrk="1" latinLnBrk="0" hangingPunct="1">
-        <a:defRPr sz="307" kern="1200">
+      <a:lvl3pPr marL="91440" algn="l" defTabSz="91440" rtl="0" eaLnBrk="1" latinLnBrk="0" hangingPunct="1">
+        <a:defRPr sz="180" kern="1200">
           <a:solidFill>
             <a:schemeClr val="tx1"/>
           </a:solidFill>
@@ -2898,8 +2898,8 @@
           <a:cs typeface="+mn-cs"/>
         </a:defRPr>
       </a:lvl3pPr>
-      <a:lvl4pPr marL="234269" algn="l" defTabSz="156180" rtl="0" eaLnBrk="1" latinLnBrk="0" hangingPunct="1">
-        <a:defRPr sz="307" kern="1200">
+      <a:lvl4pPr marL="137160" algn="l" defTabSz="91440" rtl="0" eaLnBrk="1" latinLnBrk="0" hangingPunct="1">
+        <a:defRPr sz="180" kern="1200">
           <a:solidFill>
             <a:schemeClr val="tx1"/>
           </a:solidFill>
@@ -2908,8 +2908,8 @@
           <a:cs typeface="+mn-cs"/>
         </a:defRPr>
       </a:lvl4pPr>
-      <a:lvl5pPr marL="312359" algn="l" defTabSz="156180" rtl="0" eaLnBrk="1" latinLnBrk="0" hangingPunct="1">
-        <a:defRPr sz="307" kern="1200">
+      <a:lvl5pPr marL="182880" algn="l" defTabSz="91440" rtl="0" eaLnBrk="1" latinLnBrk="0" hangingPunct="1">
+        <a:defRPr sz="180" kern="1200">
           <a:solidFill>
             <a:schemeClr val="tx1"/>
           </a:solidFill>
@@ -2918,8 +2918,8 @@
           <a:cs typeface="+mn-cs"/>
         </a:defRPr>
       </a:lvl5pPr>
-      <a:lvl6pPr marL="390449" algn="l" defTabSz="156180" rtl="0" eaLnBrk="1" latinLnBrk="0" hangingPunct="1">
-        <a:defRPr sz="307" kern="1200">
+      <a:lvl6pPr marL="228600" algn="l" defTabSz="91440" rtl="0" eaLnBrk="1" latinLnBrk="0" hangingPunct="1">
+        <a:defRPr sz="180" kern="1200">
           <a:solidFill>
             <a:schemeClr val="tx1"/>
           </a:solidFill>
@@ -2928,8 +2928,8 @@
           <a:cs typeface="+mn-cs"/>
         </a:defRPr>
       </a:lvl6pPr>
-      <a:lvl7pPr marL="468539" algn="l" defTabSz="156180" rtl="0" eaLnBrk="1" latinLnBrk="0" hangingPunct="1">
-        <a:defRPr sz="307" kern="1200">
+      <a:lvl7pPr marL="274320" algn="l" defTabSz="91440" rtl="0" eaLnBrk="1" latinLnBrk="0" hangingPunct="1">
+        <a:defRPr sz="180" kern="1200">
           <a:solidFill>
             <a:schemeClr val="tx1"/>
           </a:solidFill>
@@ -2938,8 +2938,8 @@
           <a:cs typeface="+mn-cs"/>
         </a:defRPr>
       </a:lvl7pPr>
-      <a:lvl8pPr marL="546628" algn="l" defTabSz="156180" rtl="0" eaLnBrk="1" latinLnBrk="0" hangingPunct="1">
-        <a:defRPr sz="307" kern="1200">
+      <a:lvl8pPr marL="320040" algn="l" defTabSz="91440" rtl="0" eaLnBrk="1" latinLnBrk="0" hangingPunct="1">
+        <a:defRPr sz="180" kern="1200">
           <a:solidFill>
             <a:schemeClr val="tx1"/>
           </a:solidFill>
@@ -2948,8 +2948,8 @@
           <a:cs typeface="+mn-cs"/>
         </a:defRPr>
       </a:lvl8pPr>
-      <a:lvl9pPr marL="624718" algn="l" defTabSz="156180" rtl="0" eaLnBrk="1" latinLnBrk="0" hangingPunct="1">
-        <a:defRPr sz="307" kern="1200">
+      <a:lvl9pPr marL="365760" algn="l" defTabSz="91440" rtl="0" eaLnBrk="1" latinLnBrk="0" hangingPunct="1">
+        <a:defRPr sz="180" kern="1200">
           <a:solidFill>
             <a:schemeClr val="tx1"/>
           </a:solidFill>
@@ -2982,10 +2982,10 @@
       </p:grpSpPr>
       <p:sp>
         <p:nvSpPr>
-          <p:cNvPr id="37" name="TextBox 36">
+          <p:cNvPr id="4" name="TextBox 3">
             <a:extLst>
               <a:ext uri="{FF2B5EF4-FFF2-40B4-BE49-F238E27FC236}">
-                <a16:creationId xmlns:a16="http://schemas.microsoft.com/office/drawing/2014/main" id="{544536D0-8F0F-46E5-AAAC-260C6233344E}"/>
+                <a16:creationId xmlns:a16="http://schemas.microsoft.com/office/drawing/2014/main" id="{8C8BF422-8B5D-4CCB-B0E1-E5C1B5D87A06}"/>
               </a:ext>
             </a:extLst>
           </p:cNvPr>
@@ -2994,8 +2994,8 @@
         </p:nvSpPr>
         <p:spPr>
           <a:xfrm>
-            <a:off x="-161702" y="-491505"/>
-            <a:ext cx="1885503" cy="3154710"/>
+            <a:off x="-485552" y="193298"/>
+            <a:ext cx="1885503" cy="1785104"/>
           </a:xfrm>
           <a:prstGeom prst="rect">
             <a:avLst/>
@@ -3010,7 +3010,7 @@
           <a:p>
             <a:pPr algn="ctr"/>
             <a:r>
-              <a:rPr lang="en-US" sz="19900" dirty="0">
+              <a:rPr lang="en-US" sz="11000" dirty="0">
                 <a:latin typeface="Bahnschrift" panose="020B0502040204020203" pitchFamily="34" charset="0"/>
               </a:rPr>
               <a:t>0</a:t>
@@ -3021,7 +3021,7 @@
     </p:spTree>
     <p:extLst>
       <p:ext uri="{BB962C8B-B14F-4D97-AF65-F5344CB8AC3E}">
-        <p14:creationId xmlns:p14="http://schemas.microsoft.com/office/powerpoint/2010/main" val="4188171207"/>
+        <p14:creationId xmlns:p14="http://schemas.microsoft.com/office/powerpoint/2010/main" val="3049104412"/>
       </p:ext>
     </p:extLst>
   </p:cSld>
@@ -3050,10 +3050,10 @@
       </p:grpSpPr>
       <p:sp>
         <p:nvSpPr>
-          <p:cNvPr id="37" name="TextBox 36">
+          <p:cNvPr id="6" name="TextBox 5">
             <a:extLst>
               <a:ext uri="{FF2B5EF4-FFF2-40B4-BE49-F238E27FC236}">
-                <a16:creationId xmlns:a16="http://schemas.microsoft.com/office/drawing/2014/main" id="{544536D0-8F0F-46E5-AAAC-260C6233344E}"/>
+                <a16:creationId xmlns:a16="http://schemas.microsoft.com/office/drawing/2014/main" id="{70FBFDD9-0BF4-4014-8D1C-8B88E0D9039C}"/>
               </a:ext>
             </a:extLst>
           </p:cNvPr>
@@ -3062,8 +3062,8 @@
         </p:nvSpPr>
         <p:spPr>
           <a:xfrm>
-            <a:off x="-161702" y="-491505"/>
-            <a:ext cx="1885503" cy="3154710"/>
+            <a:off x="-485552" y="193298"/>
+            <a:ext cx="1885503" cy="1785104"/>
           </a:xfrm>
           <a:prstGeom prst="rect">
             <a:avLst/>
@@ -3078,7 +3078,7 @@
           <a:p>
             <a:pPr algn="ctr"/>
             <a:r>
-              <a:rPr lang="en-US" sz="19900" dirty="0">
+              <a:rPr lang="en-US" sz="11000" dirty="0">
                 <a:latin typeface="Bahnschrift" panose="020B0502040204020203" pitchFamily="34" charset="0"/>
               </a:rPr>
               <a:t>9</a:t>
@@ -3089,7 +3089,7 @@
     </p:spTree>
     <p:extLst>
       <p:ext uri="{BB962C8B-B14F-4D97-AF65-F5344CB8AC3E}">
-        <p14:creationId xmlns:p14="http://schemas.microsoft.com/office/powerpoint/2010/main" val="3049104412"/>
+        <p14:creationId xmlns:p14="http://schemas.microsoft.com/office/powerpoint/2010/main" val="3951543720"/>
       </p:ext>
     </p:extLst>
   </p:cSld>
@@ -3118,10 +3118,10 @@
       </p:grpSpPr>
       <p:sp>
         <p:nvSpPr>
-          <p:cNvPr id="37" name="TextBox 36">
+          <p:cNvPr id="6" name="TextBox 5">
             <a:extLst>
               <a:ext uri="{FF2B5EF4-FFF2-40B4-BE49-F238E27FC236}">
-                <a16:creationId xmlns:a16="http://schemas.microsoft.com/office/drawing/2014/main" id="{544536D0-8F0F-46E5-AAAC-260C6233344E}"/>
+                <a16:creationId xmlns:a16="http://schemas.microsoft.com/office/drawing/2014/main" id="{70FBFDD9-0BF4-4014-8D1C-8B88E0D9039C}"/>
               </a:ext>
             </a:extLst>
           </p:cNvPr>
@@ -3130,8 +3130,8 @@
         </p:nvSpPr>
         <p:spPr>
           <a:xfrm>
-            <a:off x="-161702" y="-491505"/>
-            <a:ext cx="1885503" cy="3154710"/>
+            <a:off x="-485552" y="193298"/>
+            <a:ext cx="1885503" cy="1785104"/>
           </a:xfrm>
           <a:prstGeom prst="rect">
             <a:avLst/>
@@ -3146,7 +3146,7 @@
           <a:p>
             <a:pPr algn="ctr"/>
             <a:r>
-              <a:rPr lang="en-US" sz="19900" dirty="0">
+              <a:rPr lang="en-US" sz="11000" dirty="0">
                 <a:latin typeface="Bahnschrift" panose="020B0502040204020203" pitchFamily="34" charset="0"/>
               </a:rPr>
               <a:t>1</a:t>
@@ -3157,7 +3157,7 @@
     </p:spTree>
     <p:extLst>
       <p:ext uri="{BB962C8B-B14F-4D97-AF65-F5344CB8AC3E}">
-        <p14:creationId xmlns:p14="http://schemas.microsoft.com/office/powerpoint/2010/main" val="2275318183"/>
+        <p14:creationId xmlns:p14="http://schemas.microsoft.com/office/powerpoint/2010/main" val="2614058036"/>
       </p:ext>
     </p:extLst>
   </p:cSld>
@@ -3186,10 +3186,10 @@
       </p:grpSpPr>
       <p:sp>
         <p:nvSpPr>
-          <p:cNvPr id="37" name="TextBox 36">
+          <p:cNvPr id="6" name="TextBox 5">
             <a:extLst>
               <a:ext uri="{FF2B5EF4-FFF2-40B4-BE49-F238E27FC236}">
-                <a16:creationId xmlns:a16="http://schemas.microsoft.com/office/drawing/2014/main" id="{544536D0-8F0F-46E5-AAAC-260C6233344E}"/>
+                <a16:creationId xmlns:a16="http://schemas.microsoft.com/office/drawing/2014/main" id="{70FBFDD9-0BF4-4014-8D1C-8B88E0D9039C}"/>
               </a:ext>
             </a:extLst>
           </p:cNvPr>
@@ -3198,8 +3198,8 @@
         </p:nvSpPr>
         <p:spPr>
           <a:xfrm>
-            <a:off x="-161702" y="-491505"/>
-            <a:ext cx="1885503" cy="3154710"/>
+            <a:off x="-485552" y="193298"/>
+            <a:ext cx="1885503" cy="1785104"/>
           </a:xfrm>
           <a:prstGeom prst="rect">
             <a:avLst/>
@@ -3214,7 +3214,7 @@
           <a:p>
             <a:pPr algn="ctr"/>
             <a:r>
-              <a:rPr lang="en-US" sz="19900" dirty="0">
+              <a:rPr lang="en-US" sz="11000" dirty="0">
                 <a:latin typeface="Bahnschrift" panose="020B0502040204020203" pitchFamily="34" charset="0"/>
               </a:rPr>
               <a:t>2</a:t>
@@ -3225,7 +3225,7 @@
     </p:spTree>
     <p:extLst>
       <p:ext uri="{BB962C8B-B14F-4D97-AF65-F5344CB8AC3E}">
-        <p14:creationId xmlns:p14="http://schemas.microsoft.com/office/powerpoint/2010/main" val="4059249445"/>
+        <p14:creationId xmlns:p14="http://schemas.microsoft.com/office/powerpoint/2010/main" val="653695986"/>
       </p:ext>
     </p:extLst>
   </p:cSld>
@@ -3254,10 +3254,10 @@
       </p:grpSpPr>
       <p:sp>
         <p:nvSpPr>
-          <p:cNvPr id="37" name="TextBox 36">
+          <p:cNvPr id="6" name="TextBox 5">
             <a:extLst>
               <a:ext uri="{FF2B5EF4-FFF2-40B4-BE49-F238E27FC236}">
-                <a16:creationId xmlns:a16="http://schemas.microsoft.com/office/drawing/2014/main" id="{544536D0-8F0F-46E5-AAAC-260C6233344E}"/>
+                <a16:creationId xmlns:a16="http://schemas.microsoft.com/office/drawing/2014/main" id="{70FBFDD9-0BF4-4014-8D1C-8B88E0D9039C}"/>
               </a:ext>
             </a:extLst>
           </p:cNvPr>
@@ -3266,8 +3266,8 @@
         </p:nvSpPr>
         <p:spPr>
           <a:xfrm>
-            <a:off x="-161702" y="-491505"/>
-            <a:ext cx="1885503" cy="3154710"/>
+            <a:off x="-485552" y="193298"/>
+            <a:ext cx="1885503" cy="1785104"/>
           </a:xfrm>
           <a:prstGeom prst="rect">
             <a:avLst/>
@@ -3282,7 +3282,7 @@
           <a:p>
             <a:pPr algn="ctr"/>
             <a:r>
-              <a:rPr lang="en-US" sz="19900" dirty="0">
+              <a:rPr lang="en-US" sz="11000" dirty="0">
                 <a:latin typeface="Bahnschrift" panose="020B0502040204020203" pitchFamily="34" charset="0"/>
               </a:rPr>
               <a:t>3</a:t>
@@ -3293,7 +3293,7 @@
     </p:spTree>
     <p:extLst>
       <p:ext uri="{BB962C8B-B14F-4D97-AF65-F5344CB8AC3E}">
-        <p14:creationId xmlns:p14="http://schemas.microsoft.com/office/powerpoint/2010/main" val="896019168"/>
+        <p14:creationId xmlns:p14="http://schemas.microsoft.com/office/powerpoint/2010/main" val="2323689115"/>
       </p:ext>
     </p:extLst>
   </p:cSld>
@@ -3322,10 +3322,10 @@
       </p:grpSpPr>
       <p:sp>
         <p:nvSpPr>
-          <p:cNvPr id="37" name="TextBox 36">
+          <p:cNvPr id="6" name="TextBox 5">
             <a:extLst>
               <a:ext uri="{FF2B5EF4-FFF2-40B4-BE49-F238E27FC236}">
-                <a16:creationId xmlns:a16="http://schemas.microsoft.com/office/drawing/2014/main" id="{544536D0-8F0F-46E5-AAAC-260C6233344E}"/>
+                <a16:creationId xmlns:a16="http://schemas.microsoft.com/office/drawing/2014/main" id="{70FBFDD9-0BF4-4014-8D1C-8B88E0D9039C}"/>
               </a:ext>
             </a:extLst>
           </p:cNvPr>
@@ -3334,8 +3334,8 @@
         </p:nvSpPr>
         <p:spPr>
           <a:xfrm>
-            <a:off x="-161702" y="-491505"/>
-            <a:ext cx="1885503" cy="3154710"/>
+            <a:off x="-485552" y="193298"/>
+            <a:ext cx="1885503" cy="1785104"/>
           </a:xfrm>
           <a:prstGeom prst="rect">
             <a:avLst/>
@@ -3350,7 +3350,7 @@
           <a:p>
             <a:pPr algn="ctr"/>
             <a:r>
-              <a:rPr lang="en-US" sz="19900" dirty="0">
+              <a:rPr lang="en-US" sz="11000" dirty="0">
                 <a:latin typeface="Bahnschrift" panose="020B0502040204020203" pitchFamily="34" charset="0"/>
               </a:rPr>
               <a:t>4</a:t>
@@ -3361,7 +3361,7 @@
     </p:spTree>
     <p:extLst>
       <p:ext uri="{BB962C8B-B14F-4D97-AF65-F5344CB8AC3E}">
-        <p14:creationId xmlns:p14="http://schemas.microsoft.com/office/powerpoint/2010/main" val="1027080203"/>
+        <p14:creationId xmlns:p14="http://schemas.microsoft.com/office/powerpoint/2010/main" val="1840354768"/>
       </p:ext>
     </p:extLst>
   </p:cSld>
@@ -3390,10 +3390,10 @@
       </p:grpSpPr>
       <p:sp>
         <p:nvSpPr>
-          <p:cNvPr id="37" name="TextBox 36">
+          <p:cNvPr id="6" name="TextBox 5">
             <a:extLst>
               <a:ext uri="{FF2B5EF4-FFF2-40B4-BE49-F238E27FC236}">
-                <a16:creationId xmlns:a16="http://schemas.microsoft.com/office/drawing/2014/main" id="{544536D0-8F0F-46E5-AAAC-260C6233344E}"/>
+                <a16:creationId xmlns:a16="http://schemas.microsoft.com/office/drawing/2014/main" id="{70FBFDD9-0BF4-4014-8D1C-8B88E0D9039C}"/>
               </a:ext>
             </a:extLst>
           </p:cNvPr>
@@ -3402,8 +3402,8 @@
         </p:nvSpPr>
         <p:spPr>
           <a:xfrm>
-            <a:off x="-161702" y="-491505"/>
-            <a:ext cx="1885503" cy="3154710"/>
+            <a:off x="-485552" y="193298"/>
+            <a:ext cx="1885503" cy="1785104"/>
           </a:xfrm>
           <a:prstGeom prst="rect">
             <a:avLst/>
@@ -3418,7 +3418,7 @@
           <a:p>
             <a:pPr algn="ctr"/>
             <a:r>
-              <a:rPr lang="en-US" sz="19900" dirty="0">
+              <a:rPr lang="en-US" sz="11000" dirty="0">
                 <a:latin typeface="Bahnschrift" panose="020B0502040204020203" pitchFamily="34" charset="0"/>
               </a:rPr>
               <a:t>5</a:t>
@@ -3429,7 +3429,7 @@
     </p:spTree>
     <p:extLst>
       <p:ext uri="{BB962C8B-B14F-4D97-AF65-F5344CB8AC3E}">
-        <p14:creationId xmlns:p14="http://schemas.microsoft.com/office/powerpoint/2010/main" val="1500144107"/>
+        <p14:creationId xmlns:p14="http://schemas.microsoft.com/office/powerpoint/2010/main" val="3200549208"/>
       </p:ext>
     </p:extLst>
   </p:cSld>
@@ -3458,10 +3458,10 @@
       </p:grpSpPr>
       <p:sp>
         <p:nvSpPr>
-          <p:cNvPr id="37" name="TextBox 36">
+          <p:cNvPr id="6" name="TextBox 5">
             <a:extLst>
               <a:ext uri="{FF2B5EF4-FFF2-40B4-BE49-F238E27FC236}">
-                <a16:creationId xmlns:a16="http://schemas.microsoft.com/office/drawing/2014/main" id="{544536D0-8F0F-46E5-AAAC-260C6233344E}"/>
+                <a16:creationId xmlns:a16="http://schemas.microsoft.com/office/drawing/2014/main" id="{70FBFDD9-0BF4-4014-8D1C-8B88E0D9039C}"/>
               </a:ext>
             </a:extLst>
           </p:cNvPr>
@@ -3470,8 +3470,8 @@
         </p:nvSpPr>
         <p:spPr>
           <a:xfrm>
-            <a:off x="-161702" y="-491505"/>
-            <a:ext cx="1885503" cy="3154710"/>
+            <a:off x="-485552" y="193298"/>
+            <a:ext cx="1885503" cy="1785104"/>
           </a:xfrm>
           <a:prstGeom prst="rect">
             <a:avLst/>
@@ -3486,7 +3486,7 @@
           <a:p>
             <a:pPr algn="ctr"/>
             <a:r>
-              <a:rPr lang="en-US" sz="19900" dirty="0">
+              <a:rPr lang="en-US" sz="11000" dirty="0">
                 <a:latin typeface="Bahnschrift" panose="020B0502040204020203" pitchFamily="34" charset="0"/>
               </a:rPr>
               <a:t>6</a:t>
@@ -3497,7 +3497,7 @@
     </p:spTree>
     <p:extLst>
       <p:ext uri="{BB962C8B-B14F-4D97-AF65-F5344CB8AC3E}">
-        <p14:creationId xmlns:p14="http://schemas.microsoft.com/office/powerpoint/2010/main" val="3703936539"/>
+        <p14:creationId xmlns:p14="http://schemas.microsoft.com/office/powerpoint/2010/main" val="2511783621"/>
       </p:ext>
     </p:extLst>
   </p:cSld>
@@ -3526,10 +3526,10 @@
       </p:grpSpPr>
       <p:sp>
         <p:nvSpPr>
-          <p:cNvPr id="37" name="TextBox 36">
+          <p:cNvPr id="6" name="TextBox 5">
             <a:extLst>
               <a:ext uri="{FF2B5EF4-FFF2-40B4-BE49-F238E27FC236}">
-                <a16:creationId xmlns:a16="http://schemas.microsoft.com/office/drawing/2014/main" id="{544536D0-8F0F-46E5-AAAC-260C6233344E}"/>
+                <a16:creationId xmlns:a16="http://schemas.microsoft.com/office/drawing/2014/main" id="{70FBFDD9-0BF4-4014-8D1C-8B88E0D9039C}"/>
               </a:ext>
             </a:extLst>
           </p:cNvPr>
@@ -3538,8 +3538,8 @@
         </p:nvSpPr>
         <p:spPr>
           <a:xfrm>
-            <a:off x="-161702" y="-491505"/>
-            <a:ext cx="1885503" cy="3154710"/>
+            <a:off x="-485552" y="193298"/>
+            <a:ext cx="1885503" cy="1785104"/>
           </a:xfrm>
           <a:prstGeom prst="rect">
             <a:avLst/>
@@ -3554,7 +3554,7 @@
           <a:p>
             <a:pPr algn="ctr"/>
             <a:r>
-              <a:rPr lang="en-US" sz="19900" dirty="0">
+              <a:rPr lang="en-US" sz="11000" dirty="0">
                 <a:latin typeface="Bahnschrift" panose="020B0502040204020203" pitchFamily="34" charset="0"/>
               </a:rPr>
               <a:t>7</a:t>
@@ -3565,7 +3565,7 @@
     </p:spTree>
     <p:extLst>
       <p:ext uri="{BB962C8B-B14F-4D97-AF65-F5344CB8AC3E}">
-        <p14:creationId xmlns:p14="http://schemas.microsoft.com/office/powerpoint/2010/main" val="490552846"/>
+        <p14:creationId xmlns:p14="http://schemas.microsoft.com/office/powerpoint/2010/main" val="1211670517"/>
       </p:ext>
     </p:extLst>
   </p:cSld>
@@ -3594,10 +3594,10 @@
       </p:grpSpPr>
       <p:sp>
         <p:nvSpPr>
-          <p:cNvPr id="37" name="TextBox 36">
+          <p:cNvPr id="6" name="TextBox 5">
             <a:extLst>
               <a:ext uri="{FF2B5EF4-FFF2-40B4-BE49-F238E27FC236}">
-                <a16:creationId xmlns:a16="http://schemas.microsoft.com/office/drawing/2014/main" id="{544536D0-8F0F-46E5-AAAC-260C6233344E}"/>
+                <a16:creationId xmlns:a16="http://schemas.microsoft.com/office/drawing/2014/main" id="{70FBFDD9-0BF4-4014-8D1C-8B88E0D9039C}"/>
               </a:ext>
             </a:extLst>
           </p:cNvPr>
@@ -3606,8 +3606,8 @@
         </p:nvSpPr>
         <p:spPr>
           <a:xfrm>
-            <a:off x="-161702" y="-491505"/>
-            <a:ext cx="1885503" cy="3154710"/>
+            <a:off x="-485552" y="193298"/>
+            <a:ext cx="1885503" cy="1785104"/>
           </a:xfrm>
           <a:prstGeom prst="rect">
             <a:avLst/>
@@ -3622,7 +3622,7 @@
           <a:p>
             <a:pPr algn="ctr"/>
             <a:r>
-              <a:rPr lang="en-US" sz="19900" dirty="0">
+              <a:rPr lang="en-US" sz="11000" dirty="0">
                 <a:latin typeface="Bahnschrift" panose="020B0502040204020203" pitchFamily="34" charset="0"/>
               </a:rPr>
               <a:t>8</a:t>
@@ -3633,7 +3633,7 @@
     </p:spTree>
     <p:extLst>
       <p:ext uri="{BB962C8B-B14F-4D97-AF65-F5344CB8AC3E}">
-        <p14:creationId xmlns:p14="http://schemas.microsoft.com/office/powerpoint/2010/main" val="3544680488"/>
+        <p14:creationId xmlns:p14="http://schemas.microsoft.com/office/powerpoint/2010/main" val="3893056885"/>
       </p:ext>
     </p:extLst>
   </p:cSld>

</xml_diff>